<commit_message>
Updates to presentation, minor code tweaks
</commit_message>
<xml_diff>
--- a/presentation.pptx
+++ b/presentation.pptx
@@ -1205,6 +1205,101 @@
           <a:p>
             <a:r>
               <a:rPr lang="en-US" dirty="0"/>
+              <a:t>https://</a:t>
+            </a:r>
+            <a:r>
+              <a:rPr lang="en-US" dirty="0" err="1"/>
+              <a:t>code.earthengine.google.com</a:t>
+            </a:r>
+            <a:r>
+              <a:rPr lang="en-US"/>
+              <a:t>/a1d81bd6bd1445e27f808ee29767e179</a:t>
+            </a:r>
+          </a:p>
+        </p:txBody>
+      </p:sp>
+      <p:sp>
+        <p:nvSpPr>
+          <p:cNvPr id="4" name="Slide Number Placeholder 3"/>
+          <p:cNvSpPr>
+            <a:spLocks noGrp="1"/>
+          </p:cNvSpPr>
+          <p:nvPr>
+            <p:ph type="sldNum" sz="quarter" idx="10"/>
+          </p:nvPr>
+        </p:nvSpPr>
+        <p:spPr/>
+        <p:txBody>
+          <a:bodyPr/>
+          <a:lstStyle/>
+          <a:p>
+            <a:fld id="{2B9DEA3C-E553-B84A-84ED-A7DE9A6CD79E}" type="slidenum">
+              <a:rPr lang="en-US" smtClean="0"/>
+              <a:t>13</a:t>
+            </a:fld>
+            <a:endParaRPr lang="en-US"/>
+          </a:p>
+        </p:txBody>
+      </p:sp>
+    </p:spTree>
+    <p:extLst>
+      <p:ext uri="{BB962C8B-B14F-4D97-AF65-F5344CB8AC3E}">
+        <p14:creationId xmlns:p14="http://schemas.microsoft.com/office/powerpoint/2010/main" val="2526484811"/>
+      </p:ext>
+    </p:extLst>
+  </p:cSld>
+  <p:clrMapOvr>
+    <a:masterClrMapping/>
+  </p:clrMapOvr>
+</p:notes>
+</file>
+
+<file path=ppt/notesSlides/notesSlide8.xml><?xml version="1.0" encoding="utf-8"?>
+<p:notes xmlns:a="http://schemas.openxmlformats.org/drawingml/2006/main" xmlns:r="http://schemas.openxmlformats.org/officeDocument/2006/relationships" xmlns:p="http://schemas.openxmlformats.org/presentationml/2006/main">
+  <p:cSld>
+    <p:spTree>
+      <p:nvGrpSpPr>
+        <p:cNvPr id="1" name=""/>
+        <p:cNvGrpSpPr/>
+        <p:nvPr/>
+      </p:nvGrpSpPr>
+      <p:grpSpPr>
+        <a:xfrm>
+          <a:off x="0" y="0"/>
+          <a:ext cx="0" cy="0"/>
+          <a:chOff x="0" y="0"/>
+          <a:chExt cx="0" cy="0"/>
+        </a:xfrm>
+      </p:grpSpPr>
+      <p:sp>
+        <p:nvSpPr>
+          <p:cNvPr id="2" name="Slide Image Placeholder 1"/>
+          <p:cNvSpPr>
+            <a:spLocks noGrp="1" noRot="1" noChangeAspect="1"/>
+          </p:cNvSpPr>
+          <p:nvPr>
+            <p:ph type="sldImg"/>
+          </p:nvPr>
+        </p:nvSpPr>
+        <p:spPr/>
+      </p:sp>
+      <p:sp>
+        <p:nvSpPr>
+          <p:cNvPr id="3" name="Notes Placeholder 2"/>
+          <p:cNvSpPr>
+            <a:spLocks noGrp="1"/>
+          </p:cNvSpPr>
+          <p:nvPr>
+            <p:ph type="body" idx="1"/>
+          </p:nvPr>
+        </p:nvSpPr>
+        <p:spPr/>
+        <p:txBody>
+          <a:bodyPr/>
+          <a:lstStyle/>
+          <a:p>
+            <a:r>
+              <a:rPr lang="en-US" dirty="0"/>
               <a:t>You could spend a lot of time becoming an Earth Engine expert. </a:t>
             </a:r>
           </a:p>
@@ -1255,7 +1350,7 @@
 </p:notes>
 </file>
 
-<file path=ppt/notesSlides/notesSlide8.xml><?xml version="1.0" encoding="utf-8"?>
+<file path=ppt/notesSlides/notesSlide9.xml><?xml version="1.0" encoding="utf-8"?>
 <p:notes xmlns:a="http://schemas.openxmlformats.org/drawingml/2006/main" xmlns:r="http://schemas.openxmlformats.org/officeDocument/2006/relationships" xmlns:p="http://schemas.openxmlformats.org/presentationml/2006/main">
   <p:cSld>
     <p:spTree>
@@ -7448,16 +7543,24 @@
               <a:buNone/>
             </a:pPr>
             <a:r>
-              <a:rPr lang="en-US" sz="4000" dirty="0" err="1"/>
-              <a:t>code.earthengine.google.com</a:t>
-            </a:r>
-            <a:endParaRPr lang="en-US" sz="4000" dirty="0"/>
-          </a:p>
-          <a:p>
-            <a:pPr marL="0" indent="0">
-              <a:buNone/>
-            </a:pPr>
-            <a:endParaRPr lang="en-US" sz="4000" dirty="0"/>
+              <a:rPr lang="en-US" sz="5400" dirty="0">
+                <a:hlinkClick r:id="rId3"/>
+              </a:rPr>
+              <a:t>https://</a:t>
+            </a:r>
+            <a:r>
+              <a:rPr lang="en-US" sz="5400" dirty="0" err="1">
+                <a:hlinkClick r:id="rId3"/>
+              </a:rPr>
+              <a:t>goo.gl</a:t>
+            </a:r>
+            <a:r>
+              <a:rPr lang="en-US" sz="5400" dirty="0">
+                <a:hlinkClick r:id="rId3"/>
+              </a:rPr>
+              <a:t>/xDdz6u</a:t>
+            </a:r>
+            <a:endParaRPr lang="en-US" sz="5400" dirty="0"/>
           </a:p>
         </p:txBody>
       </p:sp>

</xml_diff>

<commit_message>
Very minor pres tweak
</commit_message>
<xml_diff>
--- a/presentation.pptx
+++ b/presentation.pptx
@@ -588,6 +588,90 @@
 </p:notes>
 </file>
 
+<file path=ppt/notesSlides/notesSlide10.xml><?xml version="1.0" encoding="utf-8"?>
+<p:notes xmlns:a="http://schemas.openxmlformats.org/drawingml/2006/main" xmlns:r="http://schemas.openxmlformats.org/officeDocument/2006/relationships" xmlns:p="http://schemas.openxmlformats.org/presentationml/2006/main">
+  <p:cSld>
+    <p:spTree>
+      <p:nvGrpSpPr>
+        <p:cNvPr id="1" name=""/>
+        <p:cNvGrpSpPr/>
+        <p:nvPr/>
+      </p:nvGrpSpPr>
+      <p:grpSpPr>
+        <a:xfrm>
+          <a:off x="0" y="0"/>
+          <a:ext cx="0" cy="0"/>
+          <a:chOff x="0" y="0"/>
+          <a:chExt cx="0" cy="0"/>
+        </a:xfrm>
+      </p:grpSpPr>
+      <p:sp>
+        <p:nvSpPr>
+          <p:cNvPr id="2" name="Slide Image Placeholder 1"/>
+          <p:cNvSpPr>
+            <a:spLocks noGrp="1" noRot="1" noChangeAspect="1"/>
+          </p:cNvSpPr>
+          <p:nvPr>
+            <p:ph type="sldImg"/>
+          </p:nvPr>
+        </p:nvSpPr>
+        <p:spPr/>
+      </p:sp>
+      <p:sp>
+        <p:nvSpPr>
+          <p:cNvPr id="3" name="Notes Placeholder 2"/>
+          <p:cNvSpPr>
+            <a:spLocks noGrp="1"/>
+          </p:cNvSpPr>
+          <p:nvPr>
+            <p:ph type="body" idx="1"/>
+          </p:nvPr>
+        </p:nvSpPr>
+        <p:spPr/>
+        <p:txBody>
+          <a:bodyPr/>
+          <a:lstStyle/>
+          <a:p>
+            <a:endParaRPr lang="en-US" dirty="0"/>
+          </a:p>
+        </p:txBody>
+      </p:sp>
+      <p:sp>
+        <p:nvSpPr>
+          <p:cNvPr id="4" name="Slide Number Placeholder 3"/>
+          <p:cNvSpPr>
+            <a:spLocks noGrp="1"/>
+          </p:cNvSpPr>
+          <p:nvPr>
+            <p:ph type="sldNum" sz="quarter" idx="10"/>
+          </p:nvPr>
+        </p:nvSpPr>
+        <p:spPr/>
+        <p:txBody>
+          <a:bodyPr/>
+          <a:lstStyle/>
+          <a:p>
+            <a:fld id="{2B9DEA3C-E553-B84A-84ED-A7DE9A6CD79E}" type="slidenum">
+              <a:rPr lang="en-US" smtClean="0"/>
+              <a:t>19</a:t>
+            </a:fld>
+            <a:endParaRPr lang="en-US"/>
+          </a:p>
+        </p:txBody>
+      </p:sp>
+    </p:spTree>
+    <p:extLst>
+      <p:ext uri="{BB962C8B-B14F-4D97-AF65-F5344CB8AC3E}">
+        <p14:creationId xmlns:p14="http://schemas.microsoft.com/office/powerpoint/2010/main" val="3032694919"/>
+      </p:ext>
+    </p:extLst>
+  </p:cSld>
+  <p:clrMapOvr>
+    <a:masterClrMapping/>
+  </p:clrMapOvr>
+</p:notes>
+</file>
+
 <file path=ppt/notesSlides/notesSlide2.xml><?xml version="1.0" encoding="utf-8"?>
 <p:notes xmlns:a="http://schemas.openxmlformats.org/drawingml/2006/main" xmlns:r="http://schemas.openxmlformats.org/officeDocument/2006/relationships" xmlns:p="http://schemas.openxmlformats.org/presentationml/2006/main">
   <p:cSld>
@@ -1212,7 +1296,7 @@
               <a:t>code.earthengine.google.com</a:t>
             </a:r>
             <a:r>
-              <a:rPr lang="en-US"/>
+              <a:rPr lang="en-US" dirty="0"/>
               <a:t>/a1d81bd6bd1445e27f808ee29767e179</a:t>
             </a:r>
           </a:p>
@@ -8517,8 +8601,8 @@
         </p:nvSpPr>
         <p:spPr>
           <a:xfrm>
-            <a:off x="1024319" y="6488668"/>
-            <a:ext cx="10844213" cy="369332"/>
+            <a:off x="200025" y="6488668"/>
+            <a:ext cx="11668507" cy="369332"/>
           </a:xfrm>
           <a:prstGeom prst="rect">
             <a:avLst/>
@@ -8557,8 +8641,15 @@
             </a:r>
             <a:r>
               <a:rPr lang="en-US" b="1" dirty="0"/>
-              <a:t>), GIT, Markdown, filename good practice</a:t>
-            </a:r>
+              <a:t>), GIT, Markdown, </a:t>
+            </a:r>
+            <a:r>
+              <a:rPr lang="en-US" b="1" dirty="0">
+                <a:hlinkClick r:id="rId3"/>
+              </a:rPr>
+              <a:t>how to name files</a:t>
+            </a:r>
+            <a:endParaRPr lang="en-US" b="1" dirty="0"/>
           </a:p>
         </p:txBody>
       </p:sp>

</xml_diff>

<commit_message>
Added a tidy workflow tutorial, created some neater data.
</commit_message>
<xml_diff>
--- a/presentation.pptx
+++ b/presentation.pptx
@@ -715,6 +715,16 @@
         <p:txBody>
           <a:bodyPr/>
           <a:lstStyle/>
+          <a:p>
+            <a:r>
+              <a:rPr lang="en-US" dirty="0"/>
+              <a:t>Not a talk about coding </a:t>
+            </a:r>
+            <a:r>
+              <a:rPr lang="en-US"/>
+              <a:t>in industry, but happy to talk later.</a:t>
+            </a:r>
+          </a:p>
           <a:p>
             <a:r>
               <a:rPr lang="en-US" dirty="0"/>

</xml_diff>